<commit_message>
Create event XML file alpha version
</commit_message>
<xml_diff>
--- a/Description/SeatingPlan.pptx
+++ b/Description/SeatingPlan.pptx
@@ -268,7 +268,7 @@
           <a:p>
             <a:fld id="{DDCE6D58-9B57-4731-A47B-3CD41B48F0A9}" type="datetimeFigureOut">
               <a:rPr lang="de-CH" smtClean="0"/>
-              <a:t>17.04.2025</a:t>
+              <a:t>21.04.2025</a:t>
             </a:fld>
             <a:endParaRPr lang="de-CH"/>
           </a:p>
@@ -438,7 +438,7 @@
           <a:p>
             <a:fld id="{DDCE6D58-9B57-4731-A47B-3CD41B48F0A9}" type="datetimeFigureOut">
               <a:rPr lang="de-CH" smtClean="0"/>
-              <a:t>17.04.2025</a:t>
+              <a:t>21.04.2025</a:t>
             </a:fld>
             <a:endParaRPr lang="de-CH"/>
           </a:p>
@@ -618,7 +618,7 @@
           <a:p>
             <a:fld id="{DDCE6D58-9B57-4731-A47B-3CD41B48F0A9}" type="datetimeFigureOut">
               <a:rPr lang="de-CH" smtClean="0"/>
-              <a:t>17.04.2025</a:t>
+              <a:t>21.04.2025</a:t>
             </a:fld>
             <a:endParaRPr lang="de-CH"/>
           </a:p>
@@ -788,7 +788,7 @@
           <a:p>
             <a:fld id="{DDCE6D58-9B57-4731-A47B-3CD41B48F0A9}" type="datetimeFigureOut">
               <a:rPr lang="de-CH" smtClean="0"/>
-              <a:t>17.04.2025</a:t>
+              <a:t>21.04.2025</a:t>
             </a:fld>
             <a:endParaRPr lang="de-CH"/>
           </a:p>
@@ -1034,7 +1034,7 @@
           <a:p>
             <a:fld id="{DDCE6D58-9B57-4731-A47B-3CD41B48F0A9}" type="datetimeFigureOut">
               <a:rPr lang="de-CH" smtClean="0"/>
-              <a:t>17.04.2025</a:t>
+              <a:t>21.04.2025</a:t>
             </a:fld>
             <a:endParaRPr lang="de-CH"/>
           </a:p>
@@ -1266,7 +1266,7 @@
           <a:p>
             <a:fld id="{DDCE6D58-9B57-4731-A47B-3CD41B48F0A9}" type="datetimeFigureOut">
               <a:rPr lang="de-CH" smtClean="0"/>
-              <a:t>17.04.2025</a:t>
+              <a:t>21.04.2025</a:t>
             </a:fld>
             <a:endParaRPr lang="de-CH"/>
           </a:p>
@@ -1633,7 +1633,7 @@
           <a:p>
             <a:fld id="{DDCE6D58-9B57-4731-A47B-3CD41B48F0A9}" type="datetimeFigureOut">
               <a:rPr lang="de-CH" smtClean="0"/>
-              <a:t>17.04.2025</a:t>
+              <a:t>21.04.2025</a:t>
             </a:fld>
             <a:endParaRPr lang="de-CH"/>
           </a:p>
@@ -1751,7 +1751,7 @@
           <a:p>
             <a:fld id="{DDCE6D58-9B57-4731-A47B-3CD41B48F0A9}" type="datetimeFigureOut">
               <a:rPr lang="de-CH" smtClean="0"/>
-              <a:t>17.04.2025</a:t>
+              <a:t>21.04.2025</a:t>
             </a:fld>
             <a:endParaRPr lang="de-CH"/>
           </a:p>
@@ -1846,7 +1846,7 @@
           <a:p>
             <a:fld id="{DDCE6D58-9B57-4731-A47B-3CD41B48F0A9}" type="datetimeFigureOut">
               <a:rPr lang="de-CH" smtClean="0"/>
-              <a:t>17.04.2025</a:t>
+              <a:t>21.04.2025</a:t>
             </a:fld>
             <a:endParaRPr lang="de-CH"/>
           </a:p>
@@ -2123,7 +2123,7 @@
           <a:p>
             <a:fld id="{DDCE6D58-9B57-4731-A47B-3CD41B48F0A9}" type="datetimeFigureOut">
               <a:rPr lang="de-CH" smtClean="0"/>
-              <a:t>17.04.2025</a:t>
+              <a:t>21.04.2025</a:t>
             </a:fld>
             <a:endParaRPr lang="de-CH"/>
           </a:p>
@@ -2376,7 +2376,7 @@
           <a:p>
             <a:fld id="{DDCE6D58-9B57-4731-A47B-3CD41B48F0A9}" type="datetimeFigureOut">
               <a:rPr lang="de-CH" smtClean="0"/>
-              <a:t>17.04.2025</a:t>
+              <a:t>21.04.2025</a:t>
             </a:fld>
             <a:endParaRPr lang="de-CH"/>
           </a:p>
@@ -2589,7 +2589,7 @@
           <a:p>
             <a:fld id="{DDCE6D58-9B57-4731-A47B-3CD41B48F0A9}" type="datetimeFigureOut">
               <a:rPr lang="de-CH" smtClean="0"/>
-              <a:t>17.04.2025</a:t>
+              <a:t>21.04.2025</a:t>
             </a:fld>
             <a:endParaRPr lang="de-CH"/>
           </a:p>
@@ -3024,6 +3024,1165 @@
           <a:chExt cx="0" cy="0"/>
         </a:xfrm>
       </p:grpSpPr>
+      <p:cxnSp>
+        <p:nvCxnSpPr>
+          <p:cNvPr id="2" name="Gerader Verbinder 1">
+            <a:extLst>
+              <a:ext uri="{FF2B5EF4-FFF2-40B4-BE49-F238E27FC236}">
+                <a16:creationId xmlns:a16="http://schemas.microsoft.com/office/drawing/2014/main" id="{D60E4EDF-F6F3-4EC8-D6C3-EA780D800D29}"/>
+              </a:ext>
+            </a:extLst>
+          </p:cNvPr>
+          <p:cNvCxnSpPr>
+            <a:cxnSpLocks/>
+            <a:endCxn id="6" idx="2"/>
+          </p:cNvCxnSpPr>
+          <p:nvPr/>
+        </p:nvCxnSpPr>
+        <p:spPr>
+          <a:xfrm flipV="1">
+            <a:off x="3896708" y="1209138"/>
+            <a:ext cx="8722" cy="194649"/>
+          </a:xfrm>
+          <a:prstGeom prst="line">
+            <a:avLst/>
+          </a:prstGeom>
+        </p:spPr>
+        <p:style>
+          <a:lnRef idx="1">
+            <a:schemeClr val="accent1"/>
+          </a:lnRef>
+          <a:fillRef idx="0">
+            <a:schemeClr val="accent1"/>
+          </a:fillRef>
+          <a:effectRef idx="0">
+            <a:schemeClr val="accent1"/>
+          </a:effectRef>
+          <a:fontRef idx="minor">
+            <a:schemeClr val="tx1"/>
+          </a:fontRef>
+        </p:style>
+      </p:cxnSp>
+      <p:cxnSp>
+        <p:nvCxnSpPr>
+          <p:cNvPr id="3" name="Gerader Verbinder 2">
+            <a:extLst>
+              <a:ext uri="{FF2B5EF4-FFF2-40B4-BE49-F238E27FC236}">
+                <a16:creationId xmlns:a16="http://schemas.microsoft.com/office/drawing/2014/main" id="{B09F7E61-6648-D83F-174F-C4BA978A1705}"/>
+              </a:ext>
+            </a:extLst>
+          </p:cNvPr>
+          <p:cNvCxnSpPr>
+            <a:cxnSpLocks/>
+          </p:cNvCxnSpPr>
+          <p:nvPr/>
+        </p:nvCxnSpPr>
+        <p:spPr>
+          <a:xfrm flipV="1">
+            <a:off x="2145622" y="1386138"/>
+            <a:ext cx="0" cy="166815"/>
+          </a:xfrm>
+          <a:prstGeom prst="line">
+            <a:avLst/>
+          </a:prstGeom>
+        </p:spPr>
+        <p:style>
+          <a:lnRef idx="1">
+            <a:schemeClr val="accent1"/>
+          </a:lnRef>
+          <a:fillRef idx="0">
+            <a:schemeClr val="accent1"/>
+          </a:fillRef>
+          <a:effectRef idx="0">
+            <a:schemeClr val="accent1"/>
+          </a:effectRef>
+          <a:fontRef idx="minor">
+            <a:schemeClr val="tx1"/>
+          </a:fontRef>
+        </p:style>
+      </p:cxnSp>
+      <p:cxnSp>
+        <p:nvCxnSpPr>
+          <p:cNvPr id="4" name="Gerader Verbinder 3">
+            <a:extLst>
+              <a:ext uri="{FF2B5EF4-FFF2-40B4-BE49-F238E27FC236}">
+                <a16:creationId xmlns:a16="http://schemas.microsoft.com/office/drawing/2014/main" id="{6D293917-8B42-22C6-CC6D-86DE59EA755F}"/>
+              </a:ext>
+            </a:extLst>
+          </p:cNvPr>
+          <p:cNvCxnSpPr>
+            <a:cxnSpLocks/>
+          </p:cNvCxnSpPr>
+          <p:nvPr/>
+        </p:nvCxnSpPr>
+        <p:spPr>
+          <a:xfrm>
+            <a:off x="2145622" y="1396649"/>
+            <a:ext cx="4395383" cy="7138"/>
+          </a:xfrm>
+          <a:prstGeom prst="line">
+            <a:avLst/>
+          </a:prstGeom>
+        </p:spPr>
+        <p:style>
+          <a:lnRef idx="1">
+            <a:schemeClr val="accent1"/>
+          </a:lnRef>
+          <a:fillRef idx="0">
+            <a:schemeClr val="accent1"/>
+          </a:fillRef>
+          <a:effectRef idx="0">
+            <a:schemeClr val="accent1"/>
+          </a:effectRef>
+          <a:fontRef idx="minor">
+            <a:schemeClr val="tx1"/>
+          </a:fontRef>
+        </p:style>
+      </p:cxnSp>
+      <p:sp>
+        <p:nvSpPr>
+          <p:cNvPr id="5" name="Rechteck 4">
+            <a:extLst>
+              <a:ext uri="{FF2B5EF4-FFF2-40B4-BE49-F238E27FC236}">
+                <a16:creationId xmlns:a16="http://schemas.microsoft.com/office/drawing/2014/main" id="{D21FE9F8-64B5-4E35-B6EA-05F08AA2ADE4}"/>
+              </a:ext>
+            </a:extLst>
+          </p:cNvPr>
+          <p:cNvSpPr/>
+          <p:nvPr/>
+        </p:nvSpPr>
+        <p:spPr>
+          <a:xfrm>
+            <a:off x="3031171" y="1580908"/>
+            <a:ext cx="614749" cy="273141"/>
+          </a:xfrm>
+          <a:prstGeom prst="rect">
+            <a:avLst/>
+          </a:prstGeom>
+          <a:solidFill>
+            <a:srgbClr val="FFFF00"/>
+          </a:solidFill>
+          <a:ln>
+            <a:solidFill>
+              <a:schemeClr val="tx1"/>
+            </a:solidFill>
+          </a:ln>
+        </p:spPr>
+        <p:style>
+          <a:lnRef idx="2">
+            <a:schemeClr val="accent1">
+              <a:shade val="50000"/>
+            </a:schemeClr>
+          </a:lnRef>
+          <a:fillRef idx="1">
+            <a:schemeClr val="accent1"/>
+          </a:fillRef>
+          <a:effectRef idx="0">
+            <a:schemeClr val="accent1"/>
+          </a:effectRef>
+          <a:fontRef idx="minor">
+            <a:schemeClr val="lt1"/>
+          </a:fontRef>
+        </p:style>
+        <p:txBody>
+          <a:bodyPr rtlCol="0" anchor="ctr"/>
+          <a:lstStyle/>
+          <a:p>
+            <a:pPr algn="ctr"/>
+            <a:r>
+              <a:rPr lang="de-CH" sz="1000" b="1" dirty="0">
+                <a:solidFill>
+                  <a:schemeClr val="tx1"/>
+                </a:solidFill>
+                <a:latin typeface="Arial" panose="020B0604020202020204" pitchFamily="34" charset="0"/>
+                <a:cs typeface="Arial" panose="020B0604020202020204" pitchFamily="34" charset="0"/>
+              </a:rPr>
+              <a:t>Styles</a:t>
+            </a:r>
+          </a:p>
+        </p:txBody>
+      </p:sp>
+      <p:sp>
+        <p:nvSpPr>
+          <p:cNvPr id="6" name="Rechteck 5">
+            <a:extLst>
+              <a:ext uri="{FF2B5EF4-FFF2-40B4-BE49-F238E27FC236}">
+                <a16:creationId xmlns:a16="http://schemas.microsoft.com/office/drawing/2014/main" id="{1CED2CE5-7752-9423-530E-0A08F0FF8AAF}"/>
+              </a:ext>
+            </a:extLst>
+          </p:cNvPr>
+          <p:cNvSpPr/>
+          <p:nvPr/>
+        </p:nvSpPr>
+        <p:spPr>
+          <a:xfrm>
+            <a:off x="2417978" y="623456"/>
+            <a:ext cx="2974904" cy="585682"/>
+          </a:xfrm>
+          <a:prstGeom prst="rect">
+            <a:avLst/>
+          </a:prstGeom>
+          <a:solidFill>
+            <a:srgbClr val="FFFF00"/>
+          </a:solidFill>
+          <a:ln>
+            <a:solidFill>
+              <a:schemeClr val="tx1"/>
+            </a:solidFill>
+          </a:ln>
+        </p:spPr>
+        <p:style>
+          <a:lnRef idx="2">
+            <a:schemeClr val="accent1">
+              <a:shade val="50000"/>
+            </a:schemeClr>
+          </a:lnRef>
+          <a:fillRef idx="1">
+            <a:schemeClr val="accent1"/>
+          </a:fillRef>
+          <a:effectRef idx="0">
+            <a:schemeClr val="accent1"/>
+          </a:effectRef>
+          <a:fontRef idx="minor">
+            <a:schemeClr val="lt1"/>
+          </a:fontRef>
+        </p:style>
+        <p:txBody>
+          <a:bodyPr rtlCol="0" anchor="ctr"/>
+          <a:lstStyle/>
+          <a:p>
+            <a:pPr algn="ctr"/>
+            <a:r>
+              <a:rPr lang="de-CH" sz="1000" b="1" dirty="0" err="1">
+                <a:solidFill>
+                  <a:schemeClr val="tx1"/>
+                </a:solidFill>
+                <a:latin typeface="Arial" panose="020B0604020202020204" pitchFamily="34" charset="0"/>
+                <a:cs typeface="Arial" panose="020B0604020202020204" pitchFamily="34" charset="0"/>
+              </a:rPr>
+              <a:t>WwwReservationLayout</a:t>
+            </a:r>
+            <a:r>
+              <a:rPr lang="de-CH" sz="1000" b="1" dirty="0">
+                <a:solidFill>
+                  <a:schemeClr val="tx1"/>
+                </a:solidFill>
+                <a:latin typeface="Arial" panose="020B0604020202020204" pitchFamily="34" charset="0"/>
+                <a:cs typeface="Arial" panose="020B0604020202020204" pitchFamily="34" charset="0"/>
+              </a:rPr>
+              <a:t>  (Computer/GitHub)</a:t>
+            </a:r>
+          </a:p>
+          <a:p>
+            <a:pPr algn="ctr"/>
+            <a:endParaRPr lang="de-CH" sz="1000" b="1" dirty="0">
+              <a:solidFill>
+                <a:schemeClr val="tx1"/>
+              </a:solidFill>
+              <a:latin typeface="Arial" panose="020B0604020202020204" pitchFamily="34" charset="0"/>
+              <a:cs typeface="Arial" panose="020B0604020202020204" pitchFamily="34" charset="0"/>
+            </a:endParaRPr>
+          </a:p>
+          <a:p>
+            <a:pPr algn="ctr"/>
+            <a:r>
+              <a:rPr lang="de-CH" sz="1000" b="1" dirty="0" err="1">
+                <a:solidFill>
+                  <a:schemeClr val="tx1"/>
+                </a:solidFill>
+                <a:latin typeface="Arial" panose="020B0604020202020204" pitchFamily="34" charset="0"/>
+                <a:cs typeface="Arial" panose="020B0604020202020204" pitchFamily="34" charset="0"/>
+              </a:rPr>
+              <a:t>ReservationLayout</a:t>
+            </a:r>
+            <a:r>
+              <a:rPr lang="de-CH" sz="1000" b="1" dirty="0">
+                <a:solidFill>
+                  <a:schemeClr val="tx1"/>
+                </a:solidFill>
+                <a:latin typeface="Arial" panose="020B0604020202020204" pitchFamily="34" charset="0"/>
+                <a:cs typeface="Arial" panose="020B0604020202020204" pitchFamily="34" charset="0"/>
+              </a:rPr>
+              <a:t> (Server)</a:t>
+            </a:r>
+          </a:p>
+        </p:txBody>
+      </p:sp>
+      <p:sp>
+        <p:nvSpPr>
+          <p:cNvPr id="7" name="Flussdiagramm: Karte 6">
+            <a:extLst>
+              <a:ext uri="{FF2B5EF4-FFF2-40B4-BE49-F238E27FC236}">
+                <a16:creationId xmlns:a16="http://schemas.microsoft.com/office/drawing/2014/main" id="{9B0DED37-95EB-E8FD-77B7-6E12760A6F2F}"/>
+              </a:ext>
+            </a:extLst>
+          </p:cNvPr>
+          <p:cNvSpPr/>
+          <p:nvPr/>
+        </p:nvSpPr>
+        <p:spPr>
+          <a:xfrm>
+            <a:off x="1523540" y="1557838"/>
+            <a:ext cx="1238685" cy="296211"/>
+          </a:xfrm>
+          <a:prstGeom prst="flowChartPunchedCard">
+            <a:avLst/>
+          </a:prstGeom>
+          <a:solidFill>
+            <a:srgbClr val="FFFF00"/>
+          </a:solidFill>
+          <a:ln>
+            <a:solidFill>
+              <a:schemeClr val="tx1"/>
+            </a:solidFill>
+          </a:ln>
+        </p:spPr>
+        <p:style>
+          <a:lnRef idx="2">
+            <a:schemeClr val="accent1">
+              <a:shade val="50000"/>
+            </a:schemeClr>
+          </a:lnRef>
+          <a:fillRef idx="1">
+            <a:schemeClr val="accent1"/>
+          </a:fillRef>
+          <a:effectRef idx="0">
+            <a:schemeClr val="accent1"/>
+          </a:effectRef>
+          <a:fontRef idx="minor">
+            <a:schemeClr val="lt1"/>
+          </a:fontRef>
+        </p:style>
+        <p:txBody>
+          <a:bodyPr rtlCol="0" anchor="ctr"/>
+          <a:lstStyle/>
+          <a:p>
+            <a:pPr algn="ctr"/>
+            <a:r>
+              <a:rPr lang="de-CH" sz="1000" b="1" dirty="0">
+                <a:solidFill>
+                  <a:schemeClr val="tx1"/>
+                </a:solidFill>
+                <a:latin typeface="Arial" panose="020B0604020202020204" pitchFamily="34" charset="0"/>
+                <a:cs typeface="Arial" panose="020B0604020202020204" pitchFamily="34" charset="0"/>
+              </a:rPr>
+              <a:t>SeatingPlan.htm</a:t>
+            </a:r>
+          </a:p>
+        </p:txBody>
+      </p:sp>
+      <p:cxnSp>
+        <p:nvCxnSpPr>
+          <p:cNvPr id="8" name="Gerader Verbinder 7">
+            <a:extLst>
+              <a:ext uri="{FF2B5EF4-FFF2-40B4-BE49-F238E27FC236}">
+                <a16:creationId xmlns:a16="http://schemas.microsoft.com/office/drawing/2014/main" id="{F0358E2B-9351-68E2-51D4-F1AEAB64B91E}"/>
+              </a:ext>
+            </a:extLst>
+          </p:cNvPr>
+          <p:cNvCxnSpPr>
+            <a:cxnSpLocks/>
+          </p:cNvCxnSpPr>
+          <p:nvPr/>
+        </p:nvCxnSpPr>
+        <p:spPr>
+          <a:xfrm flipV="1">
+            <a:off x="3353245" y="1396649"/>
+            <a:ext cx="0" cy="166815"/>
+          </a:xfrm>
+          <a:prstGeom prst="line">
+            <a:avLst/>
+          </a:prstGeom>
+        </p:spPr>
+        <p:style>
+          <a:lnRef idx="1">
+            <a:schemeClr val="accent1"/>
+          </a:lnRef>
+          <a:fillRef idx="0">
+            <a:schemeClr val="accent1"/>
+          </a:fillRef>
+          <a:effectRef idx="0">
+            <a:schemeClr val="accent1"/>
+          </a:effectRef>
+          <a:fontRef idx="minor">
+            <a:schemeClr val="tx1"/>
+          </a:fontRef>
+        </p:style>
+      </p:cxnSp>
+      <p:cxnSp>
+        <p:nvCxnSpPr>
+          <p:cNvPr id="9" name="Gerader Verbinder 8">
+            <a:extLst>
+              <a:ext uri="{FF2B5EF4-FFF2-40B4-BE49-F238E27FC236}">
+                <a16:creationId xmlns:a16="http://schemas.microsoft.com/office/drawing/2014/main" id="{88287F10-85B9-5BD7-9EF0-739DE6D80E01}"/>
+              </a:ext>
+            </a:extLst>
+          </p:cNvPr>
+          <p:cNvCxnSpPr>
+            <a:cxnSpLocks/>
+          </p:cNvCxnSpPr>
+          <p:nvPr/>
+        </p:nvCxnSpPr>
+        <p:spPr>
+          <a:xfrm flipV="1">
+            <a:off x="4688961" y="1403787"/>
+            <a:ext cx="0" cy="204892"/>
+          </a:xfrm>
+          <a:prstGeom prst="line">
+            <a:avLst/>
+          </a:prstGeom>
+        </p:spPr>
+        <p:style>
+          <a:lnRef idx="1">
+            <a:schemeClr val="accent1"/>
+          </a:lnRef>
+          <a:fillRef idx="0">
+            <a:schemeClr val="accent1"/>
+          </a:fillRef>
+          <a:effectRef idx="0">
+            <a:schemeClr val="accent1"/>
+          </a:effectRef>
+          <a:fontRef idx="minor">
+            <a:schemeClr val="tx1"/>
+          </a:fontRef>
+        </p:style>
+      </p:cxnSp>
+      <p:cxnSp>
+        <p:nvCxnSpPr>
+          <p:cNvPr id="10" name="Gerader Verbinder 9">
+            <a:extLst>
+              <a:ext uri="{FF2B5EF4-FFF2-40B4-BE49-F238E27FC236}">
+                <a16:creationId xmlns:a16="http://schemas.microsoft.com/office/drawing/2014/main" id="{100BE514-10CF-EB50-FA31-9FE4FE2A30AE}"/>
+              </a:ext>
+            </a:extLst>
+          </p:cNvPr>
+          <p:cNvCxnSpPr>
+            <a:cxnSpLocks/>
+            <a:stCxn id="11" idx="0"/>
+          </p:cNvCxnSpPr>
+          <p:nvPr/>
+        </p:nvCxnSpPr>
+        <p:spPr>
+          <a:xfrm flipV="1">
+            <a:off x="6541005" y="1403787"/>
+            <a:ext cx="0" cy="201916"/>
+          </a:xfrm>
+          <a:prstGeom prst="line">
+            <a:avLst/>
+          </a:prstGeom>
+        </p:spPr>
+        <p:style>
+          <a:lnRef idx="1">
+            <a:schemeClr val="accent1"/>
+          </a:lnRef>
+          <a:fillRef idx="0">
+            <a:schemeClr val="accent1"/>
+          </a:fillRef>
+          <a:effectRef idx="0">
+            <a:schemeClr val="accent1"/>
+          </a:effectRef>
+          <a:fontRef idx="minor">
+            <a:schemeClr val="tx1"/>
+          </a:fontRef>
+        </p:style>
+      </p:cxnSp>
+      <p:sp>
+        <p:nvSpPr>
+          <p:cNvPr id="11" name="Rechteck 10">
+            <a:extLst>
+              <a:ext uri="{FF2B5EF4-FFF2-40B4-BE49-F238E27FC236}">
+                <a16:creationId xmlns:a16="http://schemas.microsoft.com/office/drawing/2014/main" id="{388A52DD-3BF4-EF5A-CFA3-A93ED2D5B2AC}"/>
+              </a:ext>
+            </a:extLst>
+          </p:cNvPr>
+          <p:cNvSpPr/>
+          <p:nvPr/>
+        </p:nvSpPr>
+        <p:spPr>
+          <a:xfrm>
+            <a:off x="6069354" y="1605703"/>
+            <a:ext cx="943302" cy="273141"/>
+          </a:xfrm>
+          <a:prstGeom prst="rect">
+            <a:avLst/>
+          </a:prstGeom>
+          <a:solidFill>
+            <a:srgbClr val="FFFF00"/>
+          </a:solidFill>
+          <a:ln>
+            <a:solidFill>
+              <a:schemeClr val="tx1"/>
+            </a:solidFill>
+          </a:ln>
+        </p:spPr>
+        <p:style>
+          <a:lnRef idx="2">
+            <a:schemeClr val="accent1">
+              <a:shade val="50000"/>
+            </a:schemeClr>
+          </a:lnRef>
+          <a:fillRef idx="1">
+            <a:schemeClr val="accent1"/>
+          </a:fillRef>
+          <a:effectRef idx="0">
+            <a:schemeClr val="accent1"/>
+          </a:effectRef>
+          <a:fontRef idx="minor">
+            <a:schemeClr val="lt1"/>
+          </a:fontRef>
+        </p:style>
+        <p:txBody>
+          <a:bodyPr rtlCol="0" anchor="ctr"/>
+          <a:lstStyle/>
+          <a:p>
+            <a:pPr algn="ctr"/>
+            <a:r>
+              <a:rPr lang="de-CH" sz="1000" b="1" dirty="0">
+                <a:solidFill>
+                  <a:schemeClr val="tx1"/>
+                </a:solidFill>
+                <a:latin typeface="Arial" panose="020B0604020202020204" pitchFamily="34" charset="0"/>
+                <a:cs typeface="Arial" panose="020B0604020202020204" pitchFamily="34" charset="0"/>
+              </a:rPr>
+              <a:t>Description</a:t>
+            </a:r>
+          </a:p>
+        </p:txBody>
+      </p:sp>
+      <p:cxnSp>
+        <p:nvCxnSpPr>
+          <p:cNvPr id="12" name="Gerader Verbinder 11">
+            <a:extLst>
+              <a:ext uri="{FF2B5EF4-FFF2-40B4-BE49-F238E27FC236}">
+                <a16:creationId xmlns:a16="http://schemas.microsoft.com/office/drawing/2014/main" id="{F422BE50-7688-C463-3D87-63D61DCAA392}"/>
+              </a:ext>
+            </a:extLst>
+          </p:cNvPr>
+          <p:cNvCxnSpPr>
+            <a:cxnSpLocks/>
+          </p:cNvCxnSpPr>
+          <p:nvPr/>
+        </p:nvCxnSpPr>
+        <p:spPr>
+          <a:xfrm flipV="1">
+            <a:off x="7581010" y="5536912"/>
+            <a:ext cx="0" cy="166815"/>
+          </a:xfrm>
+          <a:prstGeom prst="line">
+            <a:avLst/>
+          </a:prstGeom>
+        </p:spPr>
+        <p:style>
+          <a:lnRef idx="1">
+            <a:schemeClr val="accent1"/>
+          </a:lnRef>
+          <a:fillRef idx="0">
+            <a:schemeClr val="accent1"/>
+          </a:fillRef>
+          <a:effectRef idx="0">
+            <a:schemeClr val="accent1"/>
+          </a:effectRef>
+          <a:fontRef idx="minor">
+            <a:schemeClr val="tx1"/>
+          </a:fontRef>
+        </p:style>
+      </p:cxnSp>
+      <p:sp>
+        <p:nvSpPr>
+          <p:cNvPr id="13" name="Rechteck 12">
+            <a:extLst>
+              <a:ext uri="{FF2B5EF4-FFF2-40B4-BE49-F238E27FC236}">
+                <a16:creationId xmlns:a16="http://schemas.microsoft.com/office/drawing/2014/main" id="{0DAAC154-60E0-2A5E-3A17-31F66DEEBF53}"/>
+              </a:ext>
+            </a:extLst>
+          </p:cNvPr>
+          <p:cNvSpPr/>
+          <p:nvPr/>
+        </p:nvSpPr>
+        <p:spPr>
+          <a:xfrm>
+            <a:off x="3708303" y="1590391"/>
+            <a:ext cx="585933" cy="273141"/>
+          </a:xfrm>
+          <a:prstGeom prst="rect">
+            <a:avLst/>
+          </a:prstGeom>
+          <a:solidFill>
+            <a:srgbClr val="FFFF00"/>
+          </a:solidFill>
+          <a:ln>
+            <a:solidFill>
+              <a:schemeClr val="tx1"/>
+            </a:solidFill>
+          </a:ln>
+        </p:spPr>
+        <p:style>
+          <a:lnRef idx="2">
+            <a:schemeClr val="accent1">
+              <a:shade val="50000"/>
+            </a:schemeClr>
+          </a:lnRef>
+          <a:fillRef idx="1">
+            <a:schemeClr val="accent1"/>
+          </a:fillRef>
+          <a:effectRef idx="0">
+            <a:schemeClr val="accent1"/>
+          </a:effectRef>
+          <a:fontRef idx="minor">
+            <a:schemeClr val="lt1"/>
+          </a:fontRef>
+        </p:style>
+        <p:txBody>
+          <a:bodyPr rtlCol="0" anchor="ctr"/>
+          <a:lstStyle/>
+          <a:p>
+            <a:pPr algn="ctr"/>
+            <a:r>
+              <a:rPr lang="de-CH" sz="1000" b="1" dirty="0" err="1">
+                <a:solidFill>
+                  <a:schemeClr val="tx1"/>
+                </a:solidFill>
+                <a:latin typeface="Arial" panose="020B0604020202020204" pitchFamily="34" charset="0"/>
+                <a:cs typeface="Arial" panose="020B0604020202020204" pitchFamily="34" charset="0"/>
+              </a:rPr>
+              <a:t>jQuery</a:t>
+            </a:r>
+            <a:endParaRPr lang="de-CH" sz="1000" b="1" dirty="0">
+              <a:solidFill>
+                <a:schemeClr val="tx1"/>
+              </a:solidFill>
+              <a:latin typeface="Arial" panose="020B0604020202020204" pitchFamily="34" charset="0"/>
+              <a:cs typeface="Arial" panose="020B0604020202020204" pitchFamily="34" charset="0"/>
+            </a:endParaRPr>
+          </a:p>
+        </p:txBody>
+      </p:sp>
+      <p:cxnSp>
+        <p:nvCxnSpPr>
+          <p:cNvPr id="14" name="Gerader Verbinder 13">
+            <a:extLst>
+              <a:ext uri="{FF2B5EF4-FFF2-40B4-BE49-F238E27FC236}">
+                <a16:creationId xmlns:a16="http://schemas.microsoft.com/office/drawing/2014/main" id="{2BDDBDDC-F345-9FDF-A258-B8708A7F435B}"/>
+              </a:ext>
+            </a:extLst>
+          </p:cNvPr>
+          <p:cNvCxnSpPr>
+            <a:cxnSpLocks/>
+          </p:cNvCxnSpPr>
+          <p:nvPr/>
+        </p:nvCxnSpPr>
+        <p:spPr>
+          <a:xfrm flipV="1">
+            <a:off x="4010926" y="1406132"/>
+            <a:ext cx="0" cy="166815"/>
+          </a:xfrm>
+          <a:prstGeom prst="line">
+            <a:avLst/>
+          </a:prstGeom>
+        </p:spPr>
+        <p:style>
+          <a:lnRef idx="1">
+            <a:schemeClr val="accent1"/>
+          </a:lnRef>
+          <a:fillRef idx="0">
+            <a:schemeClr val="accent1"/>
+          </a:fillRef>
+          <a:effectRef idx="0">
+            <a:schemeClr val="accent1"/>
+          </a:effectRef>
+          <a:fontRef idx="minor">
+            <a:schemeClr val="tx1"/>
+          </a:fontRef>
+        </p:style>
+      </p:cxnSp>
+      <p:cxnSp>
+        <p:nvCxnSpPr>
+          <p:cNvPr id="15" name="Gerader Verbinder 14">
+            <a:extLst>
+              <a:ext uri="{FF2B5EF4-FFF2-40B4-BE49-F238E27FC236}">
+                <a16:creationId xmlns:a16="http://schemas.microsoft.com/office/drawing/2014/main" id="{866E53A6-DBFA-5E2C-14E1-C4DE291EED02}"/>
+              </a:ext>
+            </a:extLst>
+          </p:cNvPr>
+          <p:cNvCxnSpPr>
+            <a:cxnSpLocks/>
+          </p:cNvCxnSpPr>
+          <p:nvPr/>
+        </p:nvCxnSpPr>
+        <p:spPr>
+          <a:xfrm flipV="1">
+            <a:off x="8497566" y="5787135"/>
+            <a:ext cx="0" cy="166815"/>
+          </a:xfrm>
+          <a:prstGeom prst="line">
+            <a:avLst/>
+          </a:prstGeom>
+        </p:spPr>
+        <p:style>
+          <a:lnRef idx="1">
+            <a:schemeClr val="accent1"/>
+          </a:lnRef>
+          <a:fillRef idx="0">
+            <a:schemeClr val="accent1"/>
+          </a:fillRef>
+          <a:effectRef idx="0">
+            <a:schemeClr val="accent1"/>
+          </a:effectRef>
+          <a:fontRef idx="minor">
+            <a:schemeClr val="tx1"/>
+          </a:fontRef>
+        </p:style>
+      </p:cxnSp>
+      <p:cxnSp>
+        <p:nvCxnSpPr>
+          <p:cNvPr id="16" name="Gerader Verbinder 15">
+            <a:extLst>
+              <a:ext uri="{FF2B5EF4-FFF2-40B4-BE49-F238E27FC236}">
+                <a16:creationId xmlns:a16="http://schemas.microsoft.com/office/drawing/2014/main" id="{D7C89C56-26D7-0638-6069-5BD9A293D94F}"/>
+              </a:ext>
+            </a:extLst>
+          </p:cNvPr>
+          <p:cNvCxnSpPr>
+            <a:cxnSpLocks/>
+          </p:cNvCxnSpPr>
+          <p:nvPr/>
+        </p:nvCxnSpPr>
+        <p:spPr>
+          <a:xfrm flipH="1" flipV="1">
+            <a:off x="8719837" y="247990"/>
+            <a:ext cx="47559" cy="5624012"/>
+          </a:xfrm>
+          <a:prstGeom prst="line">
+            <a:avLst/>
+          </a:prstGeom>
+        </p:spPr>
+        <p:style>
+          <a:lnRef idx="1">
+            <a:schemeClr val="accent1"/>
+          </a:lnRef>
+          <a:fillRef idx="0">
+            <a:schemeClr val="accent1"/>
+          </a:fillRef>
+          <a:effectRef idx="0">
+            <a:schemeClr val="accent1"/>
+          </a:effectRef>
+          <a:fontRef idx="minor">
+            <a:schemeClr val="tx1"/>
+          </a:fontRef>
+        </p:style>
+      </p:cxnSp>
+      <p:cxnSp>
+        <p:nvCxnSpPr>
+          <p:cNvPr id="17" name="Gerader Verbinder 16">
+            <a:extLst>
+              <a:ext uri="{FF2B5EF4-FFF2-40B4-BE49-F238E27FC236}">
+                <a16:creationId xmlns:a16="http://schemas.microsoft.com/office/drawing/2014/main" id="{1D29CF29-F7BB-9B55-629B-24083E63893C}"/>
+              </a:ext>
+            </a:extLst>
+          </p:cNvPr>
+          <p:cNvCxnSpPr>
+            <a:cxnSpLocks/>
+          </p:cNvCxnSpPr>
+          <p:nvPr/>
+        </p:nvCxnSpPr>
+        <p:spPr>
+          <a:xfrm flipH="1" flipV="1">
+            <a:off x="1231593" y="247990"/>
+            <a:ext cx="47559" cy="5624012"/>
+          </a:xfrm>
+          <a:prstGeom prst="line">
+            <a:avLst/>
+          </a:prstGeom>
+        </p:spPr>
+        <p:style>
+          <a:lnRef idx="1">
+            <a:schemeClr val="accent1"/>
+          </a:lnRef>
+          <a:fillRef idx="0">
+            <a:schemeClr val="accent1"/>
+          </a:fillRef>
+          <a:effectRef idx="0">
+            <a:schemeClr val="accent1"/>
+          </a:effectRef>
+          <a:fontRef idx="minor">
+            <a:schemeClr val="tx1"/>
+          </a:fontRef>
+        </p:style>
+      </p:cxnSp>
+      <p:sp>
+        <p:nvSpPr>
+          <p:cNvPr id="18" name="Rechteck 17">
+            <a:extLst>
+              <a:ext uri="{FF2B5EF4-FFF2-40B4-BE49-F238E27FC236}">
+                <a16:creationId xmlns:a16="http://schemas.microsoft.com/office/drawing/2014/main" id="{693B7339-15E0-49E5-0EF9-10A3ED2D9D11}"/>
+              </a:ext>
+            </a:extLst>
+          </p:cNvPr>
+          <p:cNvSpPr/>
+          <p:nvPr/>
+        </p:nvSpPr>
+        <p:spPr>
+          <a:xfrm>
+            <a:off x="4359728" y="1595621"/>
+            <a:ext cx="639615" cy="273141"/>
+          </a:xfrm>
+          <a:prstGeom prst="rect">
+            <a:avLst/>
+          </a:prstGeom>
+          <a:solidFill>
+            <a:srgbClr val="FFFF00"/>
+          </a:solidFill>
+          <a:ln>
+            <a:solidFill>
+              <a:schemeClr val="tx1"/>
+            </a:solidFill>
+          </a:ln>
+        </p:spPr>
+        <p:style>
+          <a:lnRef idx="2">
+            <a:schemeClr val="accent1">
+              <a:shade val="50000"/>
+            </a:schemeClr>
+          </a:lnRef>
+          <a:fillRef idx="1">
+            <a:schemeClr val="accent1"/>
+          </a:fillRef>
+          <a:effectRef idx="0">
+            <a:schemeClr val="accent1"/>
+          </a:effectRef>
+          <a:fontRef idx="minor">
+            <a:schemeClr val="lt1"/>
+          </a:fontRef>
+        </p:style>
+        <p:txBody>
+          <a:bodyPr rtlCol="0" anchor="ctr"/>
+          <a:lstStyle/>
+          <a:p>
+            <a:pPr algn="ctr"/>
+            <a:r>
+              <a:rPr lang="de-CH" sz="1000" b="1" dirty="0">
+                <a:solidFill>
+                  <a:schemeClr val="tx1"/>
+                </a:solidFill>
+                <a:latin typeface="Arial" panose="020B0604020202020204" pitchFamily="34" charset="0"/>
+                <a:cs typeface="Arial" panose="020B0604020202020204" pitchFamily="34" charset="0"/>
+              </a:rPr>
+              <a:t>Scripts</a:t>
+            </a:r>
+          </a:p>
+        </p:txBody>
+      </p:sp>
+      <p:cxnSp>
+        <p:nvCxnSpPr>
+          <p:cNvPr id="19" name="Gerader Verbinder 18">
+            <a:extLst>
+              <a:ext uri="{FF2B5EF4-FFF2-40B4-BE49-F238E27FC236}">
+                <a16:creationId xmlns:a16="http://schemas.microsoft.com/office/drawing/2014/main" id="{F1415958-6980-B0B9-7403-8F1FABA043FB}"/>
+              </a:ext>
+            </a:extLst>
+          </p:cNvPr>
+          <p:cNvCxnSpPr>
+            <a:cxnSpLocks/>
+          </p:cNvCxnSpPr>
+          <p:nvPr/>
+        </p:nvCxnSpPr>
+        <p:spPr>
+          <a:xfrm flipV="1">
+            <a:off x="5791220" y="1396649"/>
+            <a:ext cx="0" cy="222112"/>
+          </a:xfrm>
+          <a:prstGeom prst="line">
+            <a:avLst/>
+          </a:prstGeom>
+        </p:spPr>
+        <p:style>
+          <a:lnRef idx="1">
+            <a:schemeClr val="accent1"/>
+          </a:lnRef>
+          <a:fillRef idx="0">
+            <a:schemeClr val="accent1"/>
+          </a:fillRef>
+          <a:effectRef idx="0">
+            <a:schemeClr val="accent1"/>
+          </a:effectRef>
+          <a:fontRef idx="minor">
+            <a:schemeClr val="tx1"/>
+          </a:fontRef>
+        </p:style>
+      </p:cxnSp>
+      <p:sp>
+        <p:nvSpPr>
+          <p:cNvPr id="20" name="Rechteck 19">
+            <a:extLst>
+              <a:ext uri="{FF2B5EF4-FFF2-40B4-BE49-F238E27FC236}">
+                <a16:creationId xmlns:a16="http://schemas.microsoft.com/office/drawing/2014/main" id="{686603EE-63ED-3DC7-9BE3-87E2D953E125}"/>
+              </a:ext>
+            </a:extLst>
+          </p:cNvPr>
+          <p:cNvSpPr/>
+          <p:nvPr/>
+        </p:nvSpPr>
+        <p:spPr>
+          <a:xfrm>
+            <a:off x="5546831" y="1605703"/>
+            <a:ext cx="464944" cy="273141"/>
+          </a:xfrm>
+          <a:prstGeom prst="rect">
+            <a:avLst/>
+          </a:prstGeom>
+          <a:solidFill>
+            <a:srgbClr val="FFFF00"/>
+          </a:solidFill>
+          <a:ln>
+            <a:solidFill>
+              <a:schemeClr val="tx1"/>
+            </a:solidFill>
+          </a:ln>
+        </p:spPr>
+        <p:style>
+          <a:lnRef idx="2">
+            <a:schemeClr val="accent1">
+              <a:shade val="50000"/>
+            </a:schemeClr>
+          </a:lnRef>
+          <a:fillRef idx="1">
+            <a:schemeClr val="accent1"/>
+          </a:fillRef>
+          <a:effectRef idx="0">
+            <a:schemeClr val="accent1"/>
+          </a:effectRef>
+          <a:fontRef idx="minor">
+            <a:schemeClr val="lt1"/>
+          </a:fontRef>
+        </p:style>
+        <p:txBody>
+          <a:bodyPr rtlCol="0" anchor="ctr"/>
+          <a:lstStyle/>
+          <a:p>
+            <a:pPr algn="ctr"/>
+            <a:r>
+              <a:rPr lang="de-CH" sz="1000" b="1" dirty="0" err="1">
+                <a:solidFill>
+                  <a:schemeClr val="tx1"/>
+                </a:solidFill>
+                <a:latin typeface="Arial" panose="020B0604020202020204" pitchFamily="34" charset="0"/>
+                <a:cs typeface="Arial" panose="020B0604020202020204" pitchFamily="34" charset="0"/>
+              </a:rPr>
+              <a:t>Php</a:t>
+            </a:r>
+            <a:endParaRPr lang="de-CH" sz="1000" b="1" dirty="0">
+              <a:solidFill>
+                <a:schemeClr val="tx1"/>
+              </a:solidFill>
+              <a:latin typeface="Arial" panose="020B0604020202020204" pitchFamily="34" charset="0"/>
+              <a:cs typeface="Arial" panose="020B0604020202020204" pitchFamily="34" charset="0"/>
+            </a:endParaRPr>
+          </a:p>
+        </p:txBody>
+      </p:sp>
+      <p:cxnSp>
+        <p:nvCxnSpPr>
+          <p:cNvPr id="21" name="Gerader Verbinder 20">
+            <a:extLst>
+              <a:ext uri="{FF2B5EF4-FFF2-40B4-BE49-F238E27FC236}">
+                <a16:creationId xmlns:a16="http://schemas.microsoft.com/office/drawing/2014/main" id="{A1510595-3FF8-EA06-4EAF-BB74DAF9B4FB}"/>
+              </a:ext>
+            </a:extLst>
+          </p:cNvPr>
+          <p:cNvCxnSpPr>
+            <a:cxnSpLocks/>
+          </p:cNvCxnSpPr>
+          <p:nvPr/>
+        </p:nvCxnSpPr>
+        <p:spPr>
+          <a:xfrm flipV="1">
+            <a:off x="5286707" y="1396649"/>
+            <a:ext cx="0" cy="212030"/>
+          </a:xfrm>
+          <a:prstGeom prst="line">
+            <a:avLst/>
+          </a:prstGeom>
+        </p:spPr>
+        <p:style>
+          <a:lnRef idx="1">
+            <a:schemeClr val="accent1"/>
+          </a:lnRef>
+          <a:fillRef idx="0">
+            <a:schemeClr val="accent1"/>
+          </a:fillRef>
+          <a:effectRef idx="0">
+            <a:schemeClr val="accent1"/>
+          </a:effectRef>
+          <a:fontRef idx="minor">
+            <a:schemeClr val="tx1"/>
+          </a:fontRef>
+        </p:style>
+      </p:cxnSp>
+      <p:sp>
+        <p:nvSpPr>
+          <p:cNvPr id="22" name="Rechteck 21">
+            <a:extLst>
+              <a:ext uri="{FF2B5EF4-FFF2-40B4-BE49-F238E27FC236}">
+                <a16:creationId xmlns:a16="http://schemas.microsoft.com/office/drawing/2014/main" id="{85157C3D-DD83-DBE6-D3EF-45992DDB442A}"/>
+              </a:ext>
+            </a:extLst>
+          </p:cNvPr>
+          <p:cNvSpPr/>
+          <p:nvPr/>
+        </p:nvSpPr>
+        <p:spPr>
+          <a:xfrm>
+            <a:off x="5042318" y="1595621"/>
+            <a:ext cx="464944" cy="273141"/>
+          </a:xfrm>
+          <a:prstGeom prst="rect">
+            <a:avLst/>
+          </a:prstGeom>
+          <a:solidFill>
+            <a:srgbClr val="FFFF00"/>
+          </a:solidFill>
+          <a:ln>
+            <a:solidFill>
+              <a:schemeClr val="tx1"/>
+            </a:solidFill>
+          </a:ln>
+        </p:spPr>
+        <p:style>
+          <a:lnRef idx="2">
+            <a:schemeClr val="accent1">
+              <a:shade val="50000"/>
+            </a:schemeClr>
+          </a:lnRef>
+          <a:fillRef idx="1">
+            <a:schemeClr val="accent1"/>
+          </a:fillRef>
+          <a:effectRef idx="0">
+            <a:schemeClr val="accent1"/>
+          </a:effectRef>
+          <a:fontRef idx="minor">
+            <a:schemeClr val="lt1"/>
+          </a:fontRef>
+        </p:style>
+        <p:txBody>
+          <a:bodyPr rtlCol="0" anchor="ctr"/>
+          <a:lstStyle/>
+          <a:p>
+            <a:pPr algn="ctr"/>
+            <a:r>
+              <a:rPr lang="de-CH" sz="1000" b="1" dirty="0" err="1">
+                <a:solidFill>
+                  <a:schemeClr val="tx1"/>
+                </a:solidFill>
+                <a:latin typeface="Arial" panose="020B0604020202020204" pitchFamily="34" charset="0"/>
+                <a:cs typeface="Arial" panose="020B0604020202020204" pitchFamily="34" charset="0"/>
+              </a:rPr>
+              <a:t>Libs</a:t>
+            </a:r>
+            <a:endParaRPr lang="de-CH" sz="1000" b="1" dirty="0">
+              <a:solidFill>
+                <a:schemeClr val="tx1"/>
+              </a:solidFill>
+              <a:latin typeface="Arial" panose="020B0604020202020204" pitchFamily="34" charset="0"/>
+              <a:cs typeface="Arial" panose="020B0604020202020204" pitchFamily="34" charset="0"/>
+            </a:endParaRPr>
+          </a:p>
+        </p:txBody>
+      </p:sp>
+      <p:sp>
+        <p:nvSpPr>
+          <p:cNvPr id="23" name="Textfeld 22">
+            <a:extLst>
+              <a:ext uri="{FF2B5EF4-FFF2-40B4-BE49-F238E27FC236}">
+                <a16:creationId xmlns:a16="http://schemas.microsoft.com/office/drawing/2014/main" id="{B1924CA7-98B6-5B26-C9A7-D607152DEA12}"/>
+              </a:ext>
+            </a:extLst>
+          </p:cNvPr>
+          <p:cNvSpPr txBox="1"/>
+          <p:nvPr/>
+        </p:nvSpPr>
+        <p:spPr>
+          <a:xfrm>
+            <a:off x="1304652" y="1854049"/>
+            <a:ext cx="1756698" cy="600164"/>
+          </a:xfrm>
+          <a:prstGeom prst="rect">
+            <a:avLst/>
+          </a:prstGeom>
+          <a:noFill/>
+        </p:spPr>
+        <p:txBody>
+          <a:bodyPr wrap="square" rtlCol="0">
+            <a:spAutoFit/>
+          </a:bodyPr>
+          <a:lstStyle/>
+          <a:p>
+            <a:pPr algn="ctr"/>
+            <a:r>
+              <a:rPr lang="de-CH" sz="1100" b="1" dirty="0">
+                <a:latin typeface="Aptos Narrow" panose="020B0004020202020204" pitchFamily="34" charset="0"/>
+              </a:rPr>
+              <a:t>App: Create </a:t>
+            </a:r>
+            <a:r>
+              <a:rPr lang="de-CH" sz="1100" b="1" dirty="0" err="1">
+                <a:latin typeface="Aptos Narrow" panose="020B0004020202020204" pitchFamily="34" charset="0"/>
+              </a:rPr>
+              <a:t>reservation</a:t>
+            </a:r>
+            <a:r>
+              <a:rPr lang="de-CH" sz="1100" b="1" dirty="0">
+                <a:latin typeface="Aptos Narrow" panose="020B0004020202020204" pitchFamily="34" charset="0"/>
+              </a:rPr>
+              <a:t> </a:t>
+            </a:r>
+            <a:r>
+              <a:rPr lang="de-CH" sz="1100" b="1" dirty="0" err="1">
+                <a:latin typeface="Aptos Narrow" panose="020B0004020202020204" pitchFamily="34" charset="0"/>
+              </a:rPr>
+              <a:t>system</a:t>
+            </a:r>
+            <a:r>
+              <a:rPr lang="de-CH" sz="1100" b="1" dirty="0">
+                <a:latin typeface="Aptos Narrow" panose="020B0004020202020204" pitchFamily="34" charset="0"/>
+              </a:rPr>
+              <a:t> </a:t>
+            </a:r>
+            <a:r>
+              <a:rPr lang="de-CH" sz="1100" b="1" dirty="0" err="1">
+                <a:latin typeface="Aptos Narrow" panose="020B0004020202020204" pitchFamily="34" charset="0"/>
+              </a:rPr>
+              <a:t>for</a:t>
+            </a:r>
+            <a:r>
+              <a:rPr lang="de-CH" sz="1100" b="1" dirty="0">
+                <a:latin typeface="Aptos Narrow" panose="020B0004020202020204" pitchFamily="34" charset="0"/>
+              </a:rPr>
+              <a:t> different </a:t>
+            </a:r>
+            <a:r>
+              <a:rPr lang="de-CH" sz="1100" b="1" dirty="0" err="1">
+                <a:latin typeface="Aptos Narrow" panose="020B0004020202020204" pitchFamily="34" charset="0"/>
+              </a:rPr>
+              <a:t>premises</a:t>
+            </a:r>
+            <a:r>
+              <a:rPr lang="de-CH" sz="1100" b="1" dirty="0">
+                <a:latin typeface="Aptos Narrow" panose="020B0004020202020204" pitchFamily="34" charset="0"/>
+              </a:rPr>
+              <a:t>/</a:t>
+            </a:r>
+            <a:r>
+              <a:rPr lang="de-CH" sz="1100" b="1" dirty="0" err="1">
+                <a:latin typeface="Aptos Narrow" panose="020B0004020202020204" pitchFamily="34" charset="0"/>
+              </a:rPr>
+              <a:t>versions</a:t>
+            </a:r>
+            <a:endParaRPr lang="de-CH" b="1" dirty="0">
+              <a:latin typeface="Aptos Narrow" panose="020B0004020202020204" pitchFamily="34" charset="0"/>
+            </a:endParaRPr>
+          </a:p>
+        </p:txBody>
+      </p:sp>
     </p:spTree>
     <p:extLst>
       <p:ext uri="{BB962C8B-B14F-4D97-AF65-F5344CB8AC3E}">
@@ -3991,14 +5150,14 @@
           <a:p>
             <a:pPr algn="ctr"/>
             <a:r>
-              <a:rPr lang="de-CH" sz="1000" b="1" dirty="0" err="1">
+              <a:rPr lang="de-CH" sz="1000" b="1">
                 <a:solidFill>
                   <a:schemeClr val="tx1"/>
                 </a:solidFill>
                 <a:latin typeface="Arial" panose="020B0604020202020204" pitchFamily="34" charset="0"/>
                 <a:cs typeface="Arial" panose="020B0604020202020204" pitchFamily="34" charset="0"/>
               </a:rPr>
-              <a:t>EventsXml</a:t>
+              <a:t>SaisonXML</a:t>
             </a:r>
             <a:endParaRPr lang="de-CH" sz="1000" b="1" dirty="0">
               <a:solidFill>
@@ -4598,8 +5757,8 @@
         </p:nvSpPr>
         <p:spPr>
           <a:xfrm>
-            <a:off x="2002653" y="1030264"/>
-            <a:ext cx="2115324" cy="273141"/>
+            <a:off x="2002653" y="743146"/>
+            <a:ext cx="2115324" cy="560260"/>
           </a:xfrm>
           <a:prstGeom prst="rect">
             <a:avLst/>
@@ -4651,6 +5810,39 @@
               <a:latin typeface="Arial" panose="020B0604020202020204" pitchFamily="34" charset="0"/>
               <a:cs typeface="Arial" panose="020B0604020202020204" pitchFamily="34" charset="0"/>
             </a:endParaRPr>
+          </a:p>
+          <a:p>
+            <a:pPr algn="ctr"/>
+            <a:r>
+              <a:rPr lang="de-CH" sz="1000" b="1" dirty="0" err="1">
+                <a:solidFill>
+                  <a:schemeClr val="tx1"/>
+                </a:solidFill>
+                <a:latin typeface="Arial" panose="020B0604020202020204" pitchFamily="34" charset="0"/>
+                <a:cs typeface="Arial" panose="020B0604020202020204" pitchFamily="34" charset="0"/>
+              </a:rPr>
+              <a:t>or</a:t>
+            </a:r>
+            <a:endParaRPr lang="de-CH" sz="1000" b="1" dirty="0">
+              <a:solidFill>
+                <a:schemeClr val="tx1"/>
+              </a:solidFill>
+              <a:latin typeface="Arial" panose="020B0604020202020204" pitchFamily="34" charset="0"/>
+              <a:cs typeface="Arial" panose="020B0604020202020204" pitchFamily="34" charset="0"/>
+            </a:endParaRPr>
+          </a:p>
+          <a:p>
+            <a:pPr algn="ctr"/>
+            <a:r>
+              <a:rPr lang="de-CH" sz="1000" b="1" dirty="0">
+                <a:solidFill>
+                  <a:schemeClr val="tx1"/>
+                </a:solidFill>
+                <a:latin typeface="Arial" panose="020B0604020202020204" pitchFamily="34" charset="0"/>
+                <a:cs typeface="Arial" panose="020B0604020202020204" pitchFamily="34" charset="0"/>
+              </a:rPr>
+              <a:t>Reservation</a:t>
+            </a:r>
           </a:p>
         </p:txBody>
       </p:sp>
@@ -5217,6 +6409,160 @@
               </a:rPr>
               <a:t> plan</a:t>
             </a:r>
+          </a:p>
+        </p:txBody>
+      </p:sp>
+      <p:cxnSp>
+        <p:nvCxnSpPr>
+          <p:cNvPr id="10" name="Gerader Verbinder 9">
+            <a:extLst>
+              <a:ext uri="{FF2B5EF4-FFF2-40B4-BE49-F238E27FC236}">
+                <a16:creationId xmlns:a16="http://schemas.microsoft.com/office/drawing/2014/main" id="{BA5BB010-DA80-B00E-F2B9-8906B1F6CDC9}"/>
+              </a:ext>
+            </a:extLst>
+          </p:cNvPr>
+          <p:cNvCxnSpPr>
+            <a:cxnSpLocks/>
+          </p:cNvCxnSpPr>
+          <p:nvPr/>
+        </p:nvCxnSpPr>
+        <p:spPr>
+          <a:xfrm flipV="1">
+            <a:off x="5447359" y="4119766"/>
+            <a:ext cx="0" cy="166815"/>
+          </a:xfrm>
+          <a:prstGeom prst="line">
+            <a:avLst/>
+          </a:prstGeom>
+        </p:spPr>
+        <p:style>
+          <a:lnRef idx="1">
+            <a:schemeClr val="accent1"/>
+          </a:lnRef>
+          <a:fillRef idx="0">
+            <a:schemeClr val="accent1"/>
+          </a:fillRef>
+          <a:effectRef idx="0">
+            <a:schemeClr val="accent1"/>
+          </a:effectRef>
+          <a:fontRef idx="minor">
+            <a:schemeClr val="tx1"/>
+          </a:fontRef>
+        </p:style>
+      </p:cxnSp>
+      <p:sp>
+        <p:nvSpPr>
+          <p:cNvPr id="11" name="Flussdiagramm: Karte 10">
+            <a:extLst>
+              <a:ext uri="{FF2B5EF4-FFF2-40B4-BE49-F238E27FC236}">
+                <a16:creationId xmlns:a16="http://schemas.microsoft.com/office/drawing/2014/main" id="{2377F196-B65A-1F25-0673-E70FF8EAABA0}"/>
+              </a:ext>
+            </a:extLst>
+          </p:cNvPr>
+          <p:cNvSpPr/>
+          <p:nvPr/>
+        </p:nvSpPr>
+        <p:spPr>
+          <a:xfrm>
+            <a:off x="4752813" y="4304081"/>
+            <a:ext cx="1374378" cy="296211"/>
+          </a:xfrm>
+          <a:prstGeom prst="flowChartPunchedCard">
+            <a:avLst/>
+          </a:prstGeom>
+          <a:solidFill>
+            <a:srgbClr val="FFFF00"/>
+          </a:solidFill>
+          <a:ln>
+            <a:solidFill>
+              <a:schemeClr val="tx1"/>
+            </a:solidFill>
+          </a:ln>
+        </p:spPr>
+        <p:style>
+          <a:lnRef idx="2">
+            <a:schemeClr val="accent1">
+              <a:shade val="50000"/>
+            </a:schemeClr>
+          </a:lnRef>
+          <a:fillRef idx="1">
+            <a:schemeClr val="accent1"/>
+          </a:fillRef>
+          <a:effectRef idx="0">
+            <a:schemeClr val="accent1"/>
+          </a:effectRef>
+          <a:fontRef idx="minor">
+            <a:schemeClr val="lt1"/>
+          </a:fontRef>
+        </p:style>
+        <p:txBody>
+          <a:bodyPr rtlCol="0" anchor="ctr"/>
+          <a:lstStyle/>
+          <a:p>
+            <a:pPr algn="ctr"/>
+            <a:r>
+              <a:rPr lang="de-CH" sz="1000" b="1" dirty="0">
+                <a:solidFill>
+                  <a:schemeClr val="tx1"/>
+                </a:solidFill>
+                <a:latin typeface="Arial" panose="020B0604020202020204" pitchFamily="34" charset="0"/>
+                <a:cs typeface="Arial" panose="020B0604020202020204" pitchFamily="34" charset="0"/>
+              </a:rPr>
+              <a:t>EventProgram.xml</a:t>
+            </a:r>
+          </a:p>
+        </p:txBody>
+      </p:sp>
+      <p:sp>
+        <p:nvSpPr>
+          <p:cNvPr id="30" name="Textfeld 29">
+            <a:extLst>
+              <a:ext uri="{FF2B5EF4-FFF2-40B4-BE49-F238E27FC236}">
+                <a16:creationId xmlns:a16="http://schemas.microsoft.com/office/drawing/2014/main" id="{176C9103-858D-C0C1-7C77-EAED996D52C4}"/>
+              </a:ext>
+            </a:extLst>
+          </p:cNvPr>
+          <p:cNvSpPr txBox="1"/>
+          <p:nvPr/>
+        </p:nvSpPr>
+        <p:spPr>
+          <a:xfrm>
+            <a:off x="4769790" y="4613336"/>
+            <a:ext cx="1352751" cy="261610"/>
+          </a:xfrm>
+          <a:prstGeom prst="rect">
+            <a:avLst/>
+          </a:prstGeom>
+          <a:noFill/>
+        </p:spPr>
+        <p:txBody>
+          <a:bodyPr wrap="square" rtlCol="0">
+            <a:spAutoFit/>
+          </a:bodyPr>
+          <a:lstStyle/>
+          <a:p>
+            <a:pPr algn="ctr"/>
+            <a:r>
+              <a:rPr lang="de-CH" sz="1100" b="1" dirty="0" err="1">
+                <a:latin typeface="Aptos Narrow" panose="020B0004020202020204" pitchFamily="34" charset="0"/>
+              </a:rPr>
+              <a:t>Defines</a:t>
+            </a:r>
+            <a:r>
+              <a:rPr lang="de-CH" sz="1100" b="1" dirty="0">
+                <a:latin typeface="Aptos Narrow" panose="020B0004020202020204" pitchFamily="34" charset="0"/>
+              </a:rPr>
+              <a:t> all </a:t>
+            </a:r>
+            <a:r>
+              <a:rPr lang="de-CH" sz="1100" b="1" dirty="0" err="1">
+                <a:latin typeface="Aptos Narrow" panose="020B0004020202020204" pitchFamily="34" charset="0"/>
+              </a:rPr>
+              <a:t>events</a:t>
+            </a:r>
+            <a:endParaRPr lang="de-CH" b="1" dirty="0">
+              <a:latin typeface="Aptos Narrow" panose="020B0004020202020204" pitchFamily="34" charset="0"/>
+            </a:endParaRPr>
           </a:p>
         </p:txBody>
       </p:sp>

</xml_diff>

<commit_message>
URLs for files and directories
</commit_message>
<xml_diff>
--- a/Description/SeatingPlan.pptx
+++ b/Description/SeatingPlan.pptx
@@ -268,7 +268,7 @@
           <a:p>
             <a:fld id="{DDCE6D58-9B57-4731-A47B-3CD41B48F0A9}" type="datetimeFigureOut">
               <a:rPr lang="de-CH" smtClean="0"/>
-              <a:t>21.04.2025</a:t>
+              <a:t>23.04.2025</a:t>
             </a:fld>
             <a:endParaRPr lang="de-CH"/>
           </a:p>
@@ -438,7 +438,7 @@
           <a:p>
             <a:fld id="{DDCE6D58-9B57-4731-A47B-3CD41B48F0A9}" type="datetimeFigureOut">
               <a:rPr lang="de-CH" smtClean="0"/>
-              <a:t>21.04.2025</a:t>
+              <a:t>23.04.2025</a:t>
             </a:fld>
             <a:endParaRPr lang="de-CH"/>
           </a:p>
@@ -618,7 +618,7 @@
           <a:p>
             <a:fld id="{DDCE6D58-9B57-4731-A47B-3CD41B48F0A9}" type="datetimeFigureOut">
               <a:rPr lang="de-CH" smtClean="0"/>
-              <a:t>21.04.2025</a:t>
+              <a:t>23.04.2025</a:t>
             </a:fld>
             <a:endParaRPr lang="de-CH"/>
           </a:p>
@@ -788,7 +788,7 @@
           <a:p>
             <a:fld id="{DDCE6D58-9B57-4731-A47B-3CD41B48F0A9}" type="datetimeFigureOut">
               <a:rPr lang="de-CH" smtClean="0"/>
-              <a:t>21.04.2025</a:t>
+              <a:t>23.04.2025</a:t>
             </a:fld>
             <a:endParaRPr lang="de-CH"/>
           </a:p>
@@ -1034,7 +1034,7 @@
           <a:p>
             <a:fld id="{DDCE6D58-9B57-4731-A47B-3CD41B48F0A9}" type="datetimeFigureOut">
               <a:rPr lang="de-CH" smtClean="0"/>
-              <a:t>21.04.2025</a:t>
+              <a:t>23.04.2025</a:t>
             </a:fld>
             <a:endParaRPr lang="de-CH"/>
           </a:p>
@@ -1266,7 +1266,7 @@
           <a:p>
             <a:fld id="{DDCE6D58-9B57-4731-A47B-3CD41B48F0A9}" type="datetimeFigureOut">
               <a:rPr lang="de-CH" smtClean="0"/>
-              <a:t>21.04.2025</a:t>
+              <a:t>23.04.2025</a:t>
             </a:fld>
             <a:endParaRPr lang="de-CH"/>
           </a:p>
@@ -1633,7 +1633,7 @@
           <a:p>
             <a:fld id="{DDCE6D58-9B57-4731-A47B-3CD41B48F0A9}" type="datetimeFigureOut">
               <a:rPr lang="de-CH" smtClean="0"/>
-              <a:t>21.04.2025</a:t>
+              <a:t>23.04.2025</a:t>
             </a:fld>
             <a:endParaRPr lang="de-CH"/>
           </a:p>
@@ -1751,7 +1751,7 @@
           <a:p>
             <a:fld id="{DDCE6D58-9B57-4731-A47B-3CD41B48F0A9}" type="datetimeFigureOut">
               <a:rPr lang="de-CH" smtClean="0"/>
-              <a:t>21.04.2025</a:t>
+              <a:t>23.04.2025</a:t>
             </a:fld>
             <a:endParaRPr lang="de-CH"/>
           </a:p>
@@ -1846,7 +1846,7 @@
           <a:p>
             <a:fld id="{DDCE6D58-9B57-4731-A47B-3CD41B48F0A9}" type="datetimeFigureOut">
               <a:rPr lang="de-CH" smtClean="0"/>
-              <a:t>21.04.2025</a:t>
+              <a:t>23.04.2025</a:t>
             </a:fld>
             <a:endParaRPr lang="de-CH"/>
           </a:p>
@@ -2123,7 +2123,7 @@
           <a:p>
             <a:fld id="{DDCE6D58-9B57-4731-A47B-3CD41B48F0A9}" type="datetimeFigureOut">
               <a:rPr lang="de-CH" smtClean="0"/>
-              <a:t>21.04.2025</a:t>
+              <a:t>23.04.2025</a:t>
             </a:fld>
             <a:endParaRPr lang="de-CH"/>
           </a:p>
@@ -2376,7 +2376,7 @@
           <a:p>
             <a:fld id="{DDCE6D58-9B57-4731-A47B-3CD41B48F0A9}" type="datetimeFigureOut">
               <a:rPr lang="de-CH" smtClean="0"/>
-              <a:t>21.04.2025</a:t>
+              <a:t>23.04.2025</a:t>
             </a:fld>
             <a:endParaRPr lang="de-CH"/>
           </a:p>
@@ -2589,7 +2589,7 @@
           <a:p>
             <a:fld id="{DDCE6D58-9B57-4731-A47B-3CD41B48F0A9}" type="datetimeFigureOut">
               <a:rPr lang="de-CH" smtClean="0"/>
-              <a:t>21.04.2025</a:t>
+              <a:t>23.04.2025</a:t>
             </a:fld>
             <a:endParaRPr lang="de-CH"/>
           </a:p>
@@ -4512,7 +4512,7 @@
                 <a:latin typeface="Arial" panose="020B0604020202020204" pitchFamily="34" charset="0"/>
                 <a:cs typeface="Arial" panose="020B0604020202020204" pitchFamily="34" charset="0"/>
               </a:rPr>
-              <a:t>Spagi_76_Chairs_v_2</a:t>
+              <a:t>Spagi_76_Chairs_V_2</a:t>
             </a:r>
           </a:p>
         </p:txBody>
@@ -5329,7 +5329,7 @@
                 <a:latin typeface="Arial" panose="020B0604020202020204" pitchFamily="34" charset="0"/>
                 <a:cs typeface="Arial" panose="020B0604020202020204" pitchFamily="34" charset="0"/>
               </a:rPr>
-              <a:t>Spagi_76_Chairs_v_2.xml</a:t>
+              <a:t>Spagi_76_Chairs_V_2.xml</a:t>
             </a:r>
           </a:p>
         </p:txBody>

</xml_diff>